<commit_message>
Alterações no Provider Menu, slide, input tests e correções
MemberDAO corrigido
</commit_message>
<xml_diff>
--- a/Docs/ChocAn.pptx
+++ b/Docs/ChocAn.pptx
@@ -11,12 +11,13 @@
     <p:sldId id="259" r:id="rId5"/>
     <p:sldId id="260" r:id="rId6"/>
     <p:sldId id="261" r:id="rId7"/>
-    <p:sldId id="262" r:id="rId8"/>
-    <p:sldId id="263" r:id="rId9"/>
-    <p:sldId id="264" r:id="rId10"/>
-    <p:sldId id="265" r:id="rId11"/>
-    <p:sldId id="266" r:id="rId12"/>
-    <p:sldId id="267" r:id="rId13"/>
+    <p:sldId id="268" r:id="rId8"/>
+    <p:sldId id="262" r:id="rId9"/>
+    <p:sldId id="263" r:id="rId10"/>
+    <p:sldId id="264" r:id="rId11"/>
+    <p:sldId id="265" r:id="rId12"/>
+    <p:sldId id="266" r:id="rId13"/>
+    <p:sldId id="267" r:id="rId14"/>
   </p:sldIdLst>
   <p:sldSz cx="12192000" cy="6858000"/>
   <p:notesSz cx="6858000" cy="9144000"/>
@@ -3192,6 +3193,112 @@
       </p:sp>
       <p:pic>
         <p:nvPicPr>
+          <p:cNvPr id="4" name="Picture 3"/>
+          <p:cNvPicPr>
+            <a:picLocks noChangeAspect="1"/>
+          </p:cNvPicPr>
+          <p:nvPr/>
+        </p:nvPicPr>
+        <p:blipFill>
+          <a:blip r:embed="rId2" cstate="print">
+            <a:extLst>
+              <a:ext uri="{28A0092B-C50C-407E-A947-70E740481C1C}">
+                <a14:useLocalDpi xmlns:a14="http://schemas.microsoft.com/office/drawing/2010/main" val="0"/>
+              </a:ext>
+            </a:extLst>
+          </a:blip>
+          <a:stretch>
+            <a:fillRect/>
+          </a:stretch>
+        </p:blipFill>
+        <p:spPr>
+          <a:xfrm>
+            <a:off x="4140279" y="2462544"/>
+            <a:ext cx="3911441" cy="3985165"/>
+          </a:xfrm>
+          <a:prstGeom prst="rect">
+            <a:avLst/>
+          </a:prstGeom>
+        </p:spPr>
+      </p:pic>
+    </p:spTree>
+    <p:extLst>
+      <p:ext uri="{BB962C8B-B14F-4D97-AF65-F5344CB8AC3E}">
+        <p14:creationId xmlns:p14="http://schemas.microsoft.com/office/powerpoint/2010/main" val="4177172036"/>
+      </p:ext>
+    </p:extLst>
+  </p:cSld>
+  <p:clrMapOvr>
+    <a:masterClrMapping/>
+  </p:clrMapOvr>
+</p:sld>
+</file>
+
+<file path=ppt/slides/slide11.xml><?xml version="1.0" encoding="utf-8"?>
+<p:sld xmlns:a="http://schemas.openxmlformats.org/drawingml/2006/main" xmlns:r="http://schemas.openxmlformats.org/officeDocument/2006/relationships" xmlns:p="http://schemas.openxmlformats.org/presentationml/2006/main">
+  <p:cSld>
+    <p:spTree>
+      <p:nvGrpSpPr>
+        <p:cNvPr id="1" name=""/>
+        <p:cNvGrpSpPr/>
+        <p:nvPr/>
+      </p:nvGrpSpPr>
+      <p:grpSpPr>
+        <a:xfrm>
+          <a:off x="0" y="0"/>
+          <a:ext cx="0" cy="0"/>
+          <a:chOff x="0" y="0"/>
+          <a:chExt cx="0" cy="0"/>
+        </a:xfrm>
+      </p:grpSpPr>
+      <p:sp>
+        <p:nvSpPr>
+          <p:cNvPr id="2" name="Title 1"/>
+          <p:cNvSpPr>
+            <a:spLocks noGrp="1"/>
+          </p:cNvSpPr>
+          <p:nvPr>
+            <p:ph type="title"/>
+          </p:nvPr>
+        </p:nvSpPr>
+        <p:spPr/>
+        <p:txBody>
+          <a:bodyPr/>
+          <a:lstStyle/>
+          <a:p>
+            <a:r>
+              <a:rPr lang="en-US" dirty="0" smtClean="0"/>
+              <a:t>2. Project Overview</a:t>
+            </a:r>
+            <a:endParaRPr lang="en-US" dirty="0"/>
+          </a:p>
+        </p:txBody>
+      </p:sp>
+      <p:sp>
+        <p:nvSpPr>
+          <p:cNvPr id="3" name="Content Placeholder 2"/>
+          <p:cNvSpPr>
+            <a:spLocks noGrp="1"/>
+          </p:cNvSpPr>
+          <p:nvPr>
+            <p:ph idx="1"/>
+          </p:nvPr>
+        </p:nvSpPr>
+        <p:spPr/>
+        <p:txBody>
+          <a:bodyPr/>
+          <a:lstStyle/>
+          <a:p>
+            <a:r>
+              <a:rPr lang="en-US" dirty="0" smtClean="0"/>
+              <a:t>Using the Mockup, some screens were designed.</a:t>
+            </a:r>
+            <a:endParaRPr lang="en-US" dirty="0"/>
+          </a:p>
+        </p:txBody>
+      </p:sp>
+      <p:pic>
+        <p:nvPicPr>
           <p:cNvPr id="5" name="Picture 4"/>
           <p:cNvPicPr>
             <a:picLocks noChangeAspect="1"/>
@@ -3263,7 +3370,7 @@
 </p:sld>
 </file>
 
-<file path=ppt/slides/slide11.xml><?xml version="1.0" encoding="utf-8"?>
+<file path=ppt/slides/slide12.xml><?xml version="1.0" encoding="utf-8"?>
 <p:sld xmlns:a="http://schemas.openxmlformats.org/drawingml/2006/main" xmlns:r="http://schemas.openxmlformats.org/officeDocument/2006/relationships" xmlns:p="http://schemas.openxmlformats.org/presentationml/2006/main">
   <p:cSld>
     <p:spTree>
@@ -3339,7 +3446,7 @@
 </p:sld>
 </file>
 
-<file path=ppt/slides/slide12.xml><?xml version="1.0" encoding="utf-8"?>
+<file path=ppt/slides/slide13.xml><?xml version="1.0" encoding="utf-8"?>
 <p:sld xmlns:a="http://schemas.openxmlformats.org/drawingml/2006/main" xmlns:r="http://schemas.openxmlformats.org/officeDocument/2006/relationships" xmlns:p="http://schemas.openxmlformats.org/presentationml/2006/main">
   <p:cSld>
     <p:spTree>
@@ -4038,6 +4145,112 @@
           <a:p>
             <a:r>
               <a:rPr lang="en-US" dirty="0" smtClean="0"/>
+              <a:t>MVC is used as a development pattern.</a:t>
+            </a:r>
+            <a:endParaRPr lang="en-US" dirty="0"/>
+          </a:p>
+        </p:txBody>
+      </p:sp>
+      <p:pic>
+        <p:nvPicPr>
+          <p:cNvPr id="6" name="Picture 5"/>
+          <p:cNvPicPr>
+            <a:picLocks noChangeAspect="1"/>
+          </p:cNvPicPr>
+          <p:nvPr/>
+        </p:nvPicPr>
+        <p:blipFill>
+          <a:blip r:embed="rId2">
+            <a:extLst>
+              <a:ext uri="{28A0092B-C50C-407E-A947-70E740481C1C}">
+                <a14:useLocalDpi xmlns:a14="http://schemas.microsoft.com/office/drawing/2010/main" val="0"/>
+              </a:ext>
+            </a:extLst>
+          </a:blip>
+          <a:stretch>
+            <a:fillRect/>
+          </a:stretch>
+        </p:blipFill>
+        <p:spPr>
+          <a:xfrm>
+            <a:off x="3928329" y="3056553"/>
+            <a:ext cx="4335341" cy="2682492"/>
+          </a:xfrm>
+          <a:prstGeom prst="rect">
+            <a:avLst/>
+          </a:prstGeom>
+        </p:spPr>
+      </p:pic>
+    </p:spTree>
+    <p:extLst>
+      <p:ext uri="{BB962C8B-B14F-4D97-AF65-F5344CB8AC3E}">
+        <p14:creationId xmlns:p14="http://schemas.microsoft.com/office/powerpoint/2010/main" val="1924755787"/>
+      </p:ext>
+    </p:extLst>
+  </p:cSld>
+  <p:clrMapOvr>
+    <a:masterClrMapping/>
+  </p:clrMapOvr>
+</p:sld>
+</file>
+
+<file path=ppt/slides/slide8.xml><?xml version="1.0" encoding="utf-8"?>
+<p:sld xmlns:a="http://schemas.openxmlformats.org/drawingml/2006/main" xmlns:r="http://schemas.openxmlformats.org/officeDocument/2006/relationships" xmlns:p="http://schemas.openxmlformats.org/presentationml/2006/main">
+  <p:cSld>
+    <p:spTree>
+      <p:nvGrpSpPr>
+        <p:cNvPr id="1" name=""/>
+        <p:cNvGrpSpPr/>
+        <p:nvPr/>
+      </p:nvGrpSpPr>
+      <p:grpSpPr>
+        <a:xfrm>
+          <a:off x="0" y="0"/>
+          <a:ext cx="0" cy="0"/>
+          <a:chOff x="0" y="0"/>
+          <a:chExt cx="0" cy="0"/>
+        </a:xfrm>
+      </p:grpSpPr>
+      <p:sp>
+        <p:nvSpPr>
+          <p:cNvPr id="2" name="Title 1"/>
+          <p:cNvSpPr>
+            <a:spLocks noGrp="1"/>
+          </p:cNvSpPr>
+          <p:nvPr>
+            <p:ph type="title"/>
+          </p:nvPr>
+        </p:nvSpPr>
+        <p:spPr/>
+        <p:txBody>
+          <a:bodyPr/>
+          <a:lstStyle/>
+          <a:p>
+            <a:r>
+              <a:rPr lang="en-US" dirty="0" smtClean="0"/>
+              <a:t>2. Project Overview</a:t>
+            </a:r>
+            <a:endParaRPr lang="en-US" dirty="0"/>
+          </a:p>
+        </p:txBody>
+      </p:sp>
+      <p:sp>
+        <p:nvSpPr>
+          <p:cNvPr id="3" name="Content Placeholder 2"/>
+          <p:cNvSpPr>
+            <a:spLocks noGrp="1"/>
+          </p:cNvSpPr>
+          <p:nvPr>
+            <p:ph idx="1"/>
+          </p:nvPr>
+        </p:nvSpPr>
+        <p:spPr/>
+        <p:txBody>
+          <a:bodyPr/>
+          <a:lstStyle/>
+          <a:p>
+            <a:r>
+              <a:rPr lang="en-US" dirty="0" smtClean="0"/>
               <a:t>Using the Mockup, some screens were designed.</a:t>
             </a:r>
             <a:endParaRPr lang="en-US" dirty="0"/>
@@ -4117,7 +4330,7 @@
 </p:sld>
 </file>
 
-<file path=ppt/slides/slide8.xml><?xml version="1.0" encoding="utf-8"?>
+<file path=ppt/slides/slide9.xml><?xml version="1.0" encoding="utf-8"?>
 <p:sld xmlns:a="http://schemas.openxmlformats.org/drawingml/2006/main" xmlns:r="http://schemas.openxmlformats.org/officeDocument/2006/relationships" xmlns:p="http://schemas.openxmlformats.org/presentationml/2006/main">
   <p:cSld>
     <p:spTree>
@@ -4244,112 +4457,6 @@
     <p:extLst>
       <p:ext uri="{BB962C8B-B14F-4D97-AF65-F5344CB8AC3E}">
         <p14:creationId xmlns:p14="http://schemas.microsoft.com/office/powerpoint/2010/main" val="4276651825"/>
-      </p:ext>
-    </p:extLst>
-  </p:cSld>
-  <p:clrMapOvr>
-    <a:masterClrMapping/>
-  </p:clrMapOvr>
-</p:sld>
-</file>
-
-<file path=ppt/slides/slide9.xml><?xml version="1.0" encoding="utf-8"?>
-<p:sld xmlns:a="http://schemas.openxmlformats.org/drawingml/2006/main" xmlns:r="http://schemas.openxmlformats.org/officeDocument/2006/relationships" xmlns:p="http://schemas.openxmlformats.org/presentationml/2006/main">
-  <p:cSld>
-    <p:spTree>
-      <p:nvGrpSpPr>
-        <p:cNvPr id="1" name=""/>
-        <p:cNvGrpSpPr/>
-        <p:nvPr/>
-      </p:nvGrpSpPr>
-      <p:grpSpPr>
-        <a:xfrm>
-          <a:off x="0" y="0"/>
-          <a:ext cx="0" cy="0"/>
-          <a:chOff x="0" y="0"/>
-          <a:chExt cx="0" cy="0"/>
-        </a:xfrm>
-      </p:grpSpPr>
-      <p:sp>
-        <p:nvSpPr>
-          <p:cNvPr id="2" name="Title 1"/>
-          <p:cNvSpPr>
-            <a:spLocks noGrp="1"/>
-          </p:cNvSpPr>
-          <p:nvPr>
-            <p:ph type="title"/>
-          </p:nvPr>
-        </p:nvSpPr>
-        <p:spPr/>
-        <p:txBody>
-          <a:bodyPr/>
-          <a:lstStyle/>
-          <a:p>
-            <a:r>
-              <a:rPr lang="en-US" dirty="0" smtClean="0"/>
-              <a:t>2. Project Overview</a:t>
-            </a:r>
-            <a:endParaRPr lang="en-US" dirty="0"/>
-          </a:p>
-        </p:txBody>
-      </p:sp>
-      <p:sp>
-        <p:nvSpPr>
-          <p:cNvPr id="3" name="Content Placeholder 2"/>
-          <p:cNvSpPr>
-            <a:spLocks noGrp="1"/>
-          </p:cNvSpPr>
-          <p:nvPr>
-            <p:ph idx="1"/>
-          </p:nvPr>
-        </p:nvSpPr>
-        <p:spPr/>
-        <p:txBody>
-          <a:bodyPr/>
-          <a:lstStyle/>
-          <a:p>
-            <a:r>
-              <a:rPr lang="en-US" dirty="0" smtClean="0"/>
-              <a:t>Using the Mockup, some screens were designed.</a:t>
-            </a:r>
-            <a:endParaRPr lang="en-US" dirty="0"/>
-          </a:p>
-        </p:txBody>
-      </p:sp>
-      <p:pic>
-        <p:nvPicPr>
-          <p:cNvPr id="4" name="Picture 3"/>
-          <p:cNvPicPr>
-            <a:picLocks noChangeAspect="1"/>
-          </p:cNvPicPr>
-          <p:nvPr/>
-        </p:nvPicPr>
-        <p:blipFill>
-          <a:blip r:embed="rId2" cstate="print">
-            <a:extLst>
-              <a:ext uri="{28A0092B-C50C-407E-A947-70E740481C1C}">
-                <a14:useLocalDpi xmlns:a14="http://schemas.microsoft.com/office/drawing/2010/main" val="0"/>
-              </a:ext>
-            </a:extLst>
-          </a:blip>
-          <a:stretch>
-            <a:fillRect/>
-          </a:stretch>
-        </p:blipFill>
-        <p:spPr>
-          <a:xfrm>
-            <a:off x="4140279" y="2462544"/>
-            <a:ext cx="3911441" cy="3985165"/>
-          </a:xfrm>
-          <a:prstGeom prst="rect">
-            <a:avLst/>
-          </a:prstGeom>
-        </p:spPr>
-      </p:pic>
-    </p:spTree>
-    <p:extLst>
-      <p:ext uri="{BB962C8B-B14F-4D97-AF65-F5344CB8AC3E}">
-        <p14:creationId xmlns:p14="http://schemas.microsoft.com/office/powerpoint/2010/main" val="4177172036"/>
       </p:ext>
     </p:extLst>
   </p:cSld>

</xml_diff>